<commit_message>
Updated report and presentation with results from Vocareum.
</commit_message>
<xml_diff>
--- a/Course_Project_Edge_Detection_Gapcynski.pptx
+++ b/Course_Project_Edge_Detection_Gapcynski.pptx
@@ -9013,7 +9013,7 @@
           <p:nvPr>
             <p:extLst>
               <p:ext uri="{D42A27DB-BD31-4B8C-83A1-F6EECF244321}">
-                <p14:modId xmlns:p14="http://schemas.microsoft.com/office/powerpoint/2010/main" val="3353800411"/>
+                <p14:modId xmlns:p14="http://schemas.microsoft.com/office/powerpoint/2010/main" val="2090617710"/>
               </p:ext>
             </p:extLst>
           </p:nvPr>
@@ -9778,8 +9778,11 @@
                       <a:r>
                         <a:rPr lang="en-US" sz="1200">
                           <a:effectLst/>
+                          <a:latin typeface="Calibri" panose="020F0502020204030204" pitchFamily="34" charset="0"/>
+                          <a:ea typeface="Calibri" panose="020F0502020204030204" pitchFamily="34" charset="0"/>
+                          <a:cs typeface="Times New Roman" panose="02020603050405020304" pitchFamily="18" charset="0"/>
                         </a:rPr>
-                        <a:t>10.6232</a:t>
+                        <a:t>6.3000</a:t>
                       </a:r>
                       <a:endParaRPr lang="en-US" sz="1100">
                         <a:effectLst/>
@@ -9847,8 +9850,11 @@
                       <a:r>
                         <a:rPr lang="en-US" sz="1200">
                           <a:effectLst/>
+                          <a:latin typeface="Calibri" panose="020F0502020204030204" pitchFamily="34" charset="0"/>
+                          <a:ea typeface="Calibri" panose="020F0502020204030204" pitchFamily="34" charset="0"/>
+                          <a:cs typeface="Times New Roman" panose="02020603050405020304" pitchFamily="18" charset="0"/>
                         </a:rPr>
-                        <a:t>0.5930</a:t>
+                        <a:t>0.4530</a:t>
                       </a:r>
                       <a:endParaRPr lang="en-US" sz="1100">
                         <a:effectLst/>
@@ -9914,12 +9920,15 @@
                         </a:spcAft>
                       </a:pPr>
                       <a:r>
-                        <a:rPr lang="en-US" sz="1200" dirty="0">
+                        <a:rPr lang="en-US" sz="1200">
                           <a:effectLst/>
+                          <a:latin typeface="Calibri" panose="020F0502020204030204" pitchFamily="34" charset="0"/>
+                          <a:ea typeface="Calibri" panose="020F0502020204030204" pitchFamily="34" charset="0"/>
+                          <a:cs typeface="Times New Roman" panose="02020603050405020304" pitchFamily="18" charset="0"/>
                         </a:rPr>
-                        <a:t>0.6353</a:t>
+                        <a:t>0.4285</a:t>
                       </a:r>
-                      <a:endParaRPr lang="en-US" sz="1100" dirty="0">
+                      <a:endParaRPr lang="en-US" sz="1100">
                         <a:effectLst/>
                         <a:latin typeface="Calibri" panose="020F0502020204030204" pitchFamily="34" charset="0"/>
                         <a:ea typeface="Calibri" panose="020F0502020204030204" pitchFamily="34" charset="0"/>
@@ -10137,12 +10146,15 @@
                         </a:spcAft>
                       </a:pPr>
                       <a:r>
-                        <a:rPr lang="en-US" sz="1200" dirty="0">
+                        <a:rPr lang="en-US" sz="1200">
                           <a:effectLst/>
+                          <a:latin typeface="Calibri" panose="020F0502020204030204" pitchFamily="34" charset="0"/>
+                          <a:ea typeface="Calibri" panose="020F0502020204030204" pitchFamily="34" charset="0"/>
+                          <a:cs typeface="Times New Roman" panose="02020603050405020304" pitchFamily="18" charset="0"/>
                         </a:rPr>
-                        <a:t>16.0494</a:t>
+                        <a:t>9.6186</a:t>
                       </a:r>
-                      <a:endParaRPr lang="en-US" sz="1100" dirty="0">
+                      <a:endParaRPr lang="en-US" sz="1100">
                         <a:effectLst/>
                         <a:latin typeface="Calibri" panose="020F0502020204030204" pitchFamily="34" charset="0"/>
                         <a:ea typeface="Calibri" panose="020F0502020204030204" pitchFamily="34" charset="0"/>
@@ -10208,8 +10220,11 @@
                       <a:r>
                         <a:rPr lang="en-US" sz="1200">
                           <a:effectLst/>
+                          <a:latin typeface="Calibri" panose="020F0502020204030204" pitchFamily="34" charset="0"/>
+                          <a:ea typeface="Calibri" panose="020F0502020204030204" pitchFamily="34" charset="0"/>
+                          <a:cs typeface="Times New Roman" panose="02020603050405020304" pitchFamily="18" charset="0"/>
                         </a:rPr>
-                        <a:t>0.7689</a:t>
+                        <a:t>0.5202</a:t>
                       </a:r>
                       <a:endParaRPr lang="en-US" sz="1100">
                         <a:effectLst/>
@@ -10277,8 +10292,11 @@
                       <a:r>
                         <a:rPr lang="en-US" sz="1200">
                           <a:effectLst/>
+                          <a:latin typeface="Calibri" panose="020F0502020204030204" pitchFamily="34" charset="0"/>
+                          <a:ea typeface="Calibri" panose="020F0502020204030204" pitchFamily="34" charset="0"/>
+                          <a:cs typeface="Times New Roman" panose="02020603050405020304" pitchFamily="18" charset="0"/>
                         </a:rPr>
-                        <a:t>0.9739</a:t>
+                        <a:t>0.4687</a:t>
                       </a:r>
                       <a:endParaRPr lang="en-US" sz="1100">
                         <a:effectLst/>
@@ -10500,8 +10518,11 @@
                       <a:r>
                         <a:rPr lang="en-US" sz="1200">
                           <a:effectLst/>
+                          <a:latin typeface="Calibri" panose="020F0502020204030204" pitchFamily="34" charset="0"/>
+                          <a:ea typeface="Calibri" panose="020F0502020204030204" pitchFamily="34" charset="0"/>
+                          <a:cs typeface="Times New Roman" panose="02020603050405020304" pitchFamily="18" charset="0"/>
                         </a:rPr>
-                        <a:t>24.1710</a:t>
+                        <a:t>15.9758</a:t>
                       </a:r>
                       <a:endParaRPr lang="en-US" sz="1100">
                         <a:effectLst/>
@@ -10569,8 +10590,11 @@
                       <a:r>
                         <a:rPr lang="en-US" sz="1200">
                           <a:effectLst/>
+                          <a:latin typeface="Calibri" panose="020F0502020204030204" pitchFamily="34" charset="0"/>
+                          <a:ea typeface="Calibri" panose="020F0502020204030204" pitchFamily="34" charset="0"/>
+                          <a:cs typeface="Times New Roman" panose="02020603050405020304" pitchFamily="18" charset="0"/>
                         </a:rPr>
-                        <a:t>1.1357</a:t>
+                        <a:t>0.6813</a:t>
                       </a:r>
                       <a:endParaRPr lang="en-US" sz="1100">
                         <a:effectLst/>
@@ -10638,8 +10662,11 @@
                       <a:r>
                         <a:rPr lang="en-US" sz="1200">
                           <a:effectLst/>
+                          <a:latin typeface="Calibri" panose="020F0502020204030204" pitchFamily="34" charset="0"/>
+                          <a:ea typeface="Calibri" panose="020F0502020204030204" pitchFamily="34" charset="0"/>
+                          <a:cs typeface="Times New Roman" panose="02020603050405020304" pitchFamily="18" charset="0"/>
                         </a:rPr>
-                        <a:t>1.1654</a:t>
+                        <a:t>0.5651</a:t>
                       </a:r>
                       <a:endParaRPr lang="en-US" sz="1100">
                         <a:effectLst/>
@@ -10861,8 +10888,11 @@
                       <a:r>
                         <a:rPr lang="en-US" sz="1200">
                           <a:effectLst/>
+                          <a:latin typeface="Calibri" panose="020F0502020204030204" pitchFamily="34" charset="0"/>
+                          <a:ea typeface="Calibri" panose="020F0502020204030204" pitchFamily="34" charset="0"/>
+                          <a:cs typeface="Times New Roman" panose="02020603050405020304" pitchFamily="18" charset="0"/>
                         </a:rPr>
-                        <a:t>48.7879</a:t>
+                        <a:t>28.9552</a:t>
                       </a:r>
                       <a:endParaRPr lang="en-US" sz="1100">
                         <a:effectLst/>
@@ -10930,8 +10960,11 @@
                       <a:r>
                         <a:rPr lang="en-US" sz="1200">
                           <a:effectLst/>
+                          <a:latin typeface="Calibri" panose="020F0502020204030204" pitchFamily="34" charset="0"/>
+                          <a:ea typeface="Calibri" panose="020F0502020204030204" pitchFamily="34" charset="0"/>
+                          <a:cs typeface="Times New Roman" panose="02020603050405020304" pitchFamily="18" charset="0"/>
                         </a:rPr>
-                        <a:t>1.9197</a:t>
+                        <a:t>1.0745</a:t>
                       </a:r>
                       <a:endParaRPr lang="en-US" sz="1100">
                         <a:effectLst/>
@@ -10999,8 +11032,11 @@
                       <a:r>
                         <a:rPr lang="en-US" sz="1200">
                           <a:effectLst/>
+                          <a:latin typeface="Calibri" panose="020F0502020204030204" pitchFamily="34" charset="0"/>
+                          <a:ea typeface="Calibri" panose="020F0502020204030204" pitchFamily="34" charset="0"/>
+                          <a:cs typeface="Times New Roman" panose="02020603050405020304" pitchFamily="18" charset="0"/>
                         </a:rPr>
-                        <a:t>2.2372</a:t>
+                        <a:t>0.8162</a:t>
                       </a:r>
                       <a:endParaRPr lang="en-US" sz="1100">
                         <a:effectLst/>
@@ -11222,8 +11258,11 @@
                       <a:r>
                         <a:rPr lang="en-US" sz="1200">
                           <a:effectLst/>
+                          <a:latin typeface="Calibri" panose="020F0502020204030204" pitchFamily="34" charset="0"/>
+                          <a:ea typeface="Calibri" panose="020F0502020204030204" pitchFamily="34" charset="0"/>
+                          <a:cs typeface="Times New Roman" panose="02020603050405020304" pitchFamily="18" charset="0"/>
                         </a:rPr>
-                        <a:t>88.7504</a:t>
+                        <a:t>52.4860</a:t>
                       </a:r>
                       <a:endParaRPr lang="en-US" sz="1100">
                         <a:effectLst/>
@@ -11291,8 +11330,11 @@
                       <a:r>
                         <a:rPr lang="en-US" sz="1200">
                           <a:effectLst/>
+                          <a:latin typeface="Calibri" panose="020F0502020204030204" pitchFamily="34" charset="0"/>
+                          <a:ea typeface="Calibri" panose="020F0502020204030204" pitchFamily="34" charset="0"/>
+                          <a:cs typeface="Times New Roman" panose="02020603050405020304" pitchFamily="18" charset="0"/>
                         </a:rPr>
-                        <a:t>3.5310</a:t>
+                        <a:t>1.5420</a:t>
                       </a:r>
                       <a:endParaRPr lang="en-US" sz="1100">
                         <a:effectLst/>
@@ -11358,12 +11400,15 @@
                         </a:spcAft>
                       </a:pPr>
                       <a:r>
-                        <a:rPr lang="en-US" sz="1200" dirty="0">
+                        <a:rPr lang="en-US" sz="1200">
                           <a:effectLst/>
+                          <a:latin typeface="Calibri" panose="020F0502020204030204" pitchFamily="34" charset="0"/>
+                          <a:ea typeface="Calibri" panose="020F0502020204030204" pitchFamily="34" charset="0"/>
+                          <a:cs typeface="Times New Roman" panose="02020603050405020304" pitchFamily="18" charset="0"/>
                         </a:rPr>
-                        <a:t>3.7038</a:t>
+                        <a:t>1.2809</a:t>
                       </a:r>
-                      <a:endParaRPr lang="en-US" sz="1100" dirty="0">
+                      <a:endParaRPr lang="en-US" sz="1100">
                         <a:effectLst/>
                         <a:latin typeface="Calibri" panose="020F0502020204030204" pitchFamily="34" charset="0"/>
                         <a:ea typeface="Calibri" panose="020F0502020204030204" pitchFamily="34" charset="0"/>
@@ -11583,8 +11628,11 @@
                       <a:r>
                         <a:rPr lang="en-US" sz="1200">
                           <a:effectLst/>
+                          <a:latin typeface="Calibri" panose="020F0502020204030204" pitchFamily="34" charset="0"/>
+                          <a:ea typeface="Calibri" panose="020F0502020204030204" pitchFamily="34" charset="0"/>
+                          <a:cs typeface="Times New Roman" panose="02020603050405020304" pitchFamily="18" charset="0"/>
                         </a:rPr>
-                        <a:t>228.5247</a:t>
+                        <a:t>135.4677</a:t>
                       </a:r>
                       <a:endParaRPr lang="en-US" sz="1100">
                         <a:effectLst/>
@@ -11652,8 +11700,11 @@
                       <a:r>
                         <a:rPr lang="en-US" sz="1200">
                           <a:effectLst/>
+                          <a:latin typeface="Calibri" panose="020F0502020204030204" pitchFamily="34" charset="0"/>
+                          <a:ea typeface="Calibri" panose="020F0502020204030204" pitchFamily="34" charset="0"/>
+                          <a:cs typeface="Times New Roman" panose="02020603050405020304" pitchFamily="18" charset="0"/>
                         </a:rPr>
-                        <a:t>7.8206</a:t>
+                        <a:t>3.0519</a:t>
                       </a:r>
                       <a:endParaRPr lang="en-US" sz="1100">
                         <a:effectLst/>
@@ -11721,8 +11772,11 @@
                       <a:r>
                         <a:rPr lang="en-US" sz="1200">
                           <a:effectLst/>
+                          <a:latin typeface="Calibri" panose="020F0502020204030204" pitchFamily="34" charset="0"/>
+                          <a:ea typeface="Calibri" panose="020F0502020204030204" pitchFamily="34" charset="0"/>
+                          <a:cs typeface="Times New Roman" panose="02020603050405020304" pitchFamily="18" charset="0"/>
                         </a:rPr>
-                        <a:t>8.3551</a:t>
+                        <a:t>2.0822</a:t>
                       </a:r>
                       <a:endParaRPr lang="en-US" sz="1100">
                         <a:effectLst/>
@@ -11944,8 +11998,11 @@
                       <a:r>
                         <a:rPr lang="en-US" sz="1200">
                           <a:effectLst/>
+                          <a:latin typeface="Calibri" panose="020F0502020204030204" pitchFamily="34" charset="0"/>
+                          <a:ea typeface="Calibri" panose="020F0502020204030204" pitchFamily="34" charset="0"/>
+                          <a:cs typeface="Times New Roman" panose="02020603050405020304" pitchFamily="18" charset="0"/>
                         </a:rPr>
-                        <a:t>516.8103</a:t>
+                        <a:t>306.9337</a:t>
                       </a:r>
                       <a:endParaRPr lang="en-US" sz="1100">
                         <a:effectLst/>
@@ -12013,8 +12070,11 @@
                       <a:r>
                         <a:rPr lang="en-US" sz="1200">
                           <a:effectLst/>
+                          <a:latin typeface="Calibri" panose="020F0502020204030204" pitchFamily="34" charset="0"/>
+                          <a:ea typeface="Calibri" panose="020F0502020204030204" pitchFamily="34" charset="0"/>
+                          <a:cs typeface="Times New Roman" panose="02020603050405020304" pitchFamily="18" charset="0"/>
                         </a:rPr>
-                        <a:t>17.3303</a:t>
+                        <a:t>7.9471</a:t>
                       </a:r>
                       <a:endParaRPr lang="en-US" sz="1100">
                         <a:effectLst/>
@@ -12082,8 +12142,11 @@
                       <a:r>
                         <a:rPr lang="en-US" sz="1200" dirty="0">
                           <a:effectLst/>
+                          <a:latin typeface="Calibri" panose="020F0502020204030204" pitchFamily="34" charset="0"/>
+                          <a:ea typeface="Calibri" panose="020F0502020204030204" pitchFamily="34" charset="0"/>
+                          <a:cs typeface="Times New Roman" panose="02020603050405020304" pitchFamily="18" charset="0"/>
                         </a:rPr>
-                        <a:t>18.7000</a:t>
+                        <a:t>5.11236</a:t>
                       </a:r>
                       <a:endParaRPr lang="en-US" sz="1100" dirty="0">
                         <a:effectLst/>
@@ -12264,12 +12327,47 @@
           </a:p>
         </p:txBody>
       </p:sp>
+      <p:sp>
+        <p:nvSpPr>
+          <p:cNvPr id="7" name="TextBox 6">
+            <a:extLst>
+              <a:ext uri="{FF2B5EF4-FFF2-40B4-BE49-F238E27FC236}">
+                <a16:creationId xmlns:a16="http://schemas.microsoft.com/office/drawing/2014/main" id="{A279EB0F-C80A-4642-9F28-ADB0DD58BAA4}"/>
+              </a:ext>
+            </a:extLst>
+          </p:cNvPr>
+          <p:cNvSpPr txBox="1"/>
+          <p:nvPr/>
+        </p:nvSpPr>
+        <p:spPr>
+          <a:xfrm>
+            <a:off x="3489860" y="6360531"/>
+            <a:ext cx="1870064" cy="276999"/>
+          </a:xfrm>
+          <a:prstGeom prst="rect">
+            <a:avLst/>
+          </a:prstGeom>
+          <a:noFill/>
+        </p:spPr>
+        <p:txBody>
+          <a:bodyPr wrap="none" rtlCol="0">
+            <a:spAutoFit/>
+          </a:bodyPr>
+          <a:lstStyle/>
+          <a:p>
+            <a:r>
+              <a:rPr lang="en-US" sz="1200" dirty="0"/>
+              <a:t>Figure 8 – Timing Results</a:t>
+            </a:r>
+          </a:p>
+        </p:txBody>
+      </p:sp>
       <p:pic>
         <p:nvPicPr>
-          <p:cNvPr id="6" name="Picture 5">
+          <p:cNvPr id="8" name="Picture 7">
             <a:extLst>
               <a:ext uri="{FF2B5EF4-FFF2-40B4-BE49-F238E27FC236}">
-                <a16:creationId xmlns:a16="http://schemas.microsoft.com/office/drawing/2014/main" id="{5736CCEB-C775-4508-87EE-7857F566F4F8}"/>
+                <a16:creationId xmlns:a16="http://schemas.microsoft.com/office/drawing/2014/main" id="{5173B984-1695-4BF5-A264-26358330CC23}"/>
               </a:ext>
             </a:extLst>
           </p:cNvPr>
@@ -12284,49 +12382,14 @@
         </p:blipFill>
         <p:spPr>
           <a:xfrm>
-            <a:off x="1845117" y="1930399"/>
-            <a:ext cx="6385401" cy="4403725"/>
+            <a:off x="677334" y="1270000"/>
+            <a:ext cx="7495116" cy="5090531"/>
           </a:xfrm>
           <a:prstGeom prst="rect">
             <a:avLst/>
           </a:prstGeom>
         </p:spPr>
       </p:pic>
-      <p:sp>
-        <p:nvSpPr>
-          <p:cNvPr id="7" name="TextBox 6">
-            <a:extLst>
-              <a:ext uri="{FF2B5EF4-FFF2-40B4-BE49-F238E27FC236}">
-                <a16:creationId xmlns:a16="http://schemas.microsoft.com/office/drawing/2014/main" id="{A279EB0F-C80A-4642-9F28-ADB0DD58BAA4}"/>
-              </a:ext>
-            </a:extLst>
-          </p:cNvPr>
-          <p:cNvSpPr txBox="1"/>
-          <p:nvPr/>
-        </p:nvSpPr>
-        <p:spPr>
-          <a:xfrm>
-            <a:off x="4102785" y="6334124"/>
-            <a:ext cx="1870064" cy="276999"/>
-          </a:xfrm>
-          <a:prstGeom prst="rect">
-            <a:avLst/>
-          </a:prstGeom>
-          <a:noFill/>
-        </p:spPr>
-        <p:txBody>
-          <a:bodyPr wrap="none" rtlCol="0">
-            <a:spAutoFit/>
-          </a:bodyPr>
-          <a:lstStyle/>
-          <a:p>
-            <a:r>
-              <a:rPr lang="en-US" sz="1200" dirty="0"/>
-              <a:t>Figure 8 – Timing Results</a:t>
-            </a:r>
-          </a:p>
-        </p:txBody>
-      </p:sp>
     </p:spTree>
     <p:extLst>
       <p:ext uri="{BB962C8B-B14F-4D97-AF65-F5344CB8AC3E}">
@@ -12404,7 +12467,7 @@
         <p:spPr/>
         <p:txBody>
           <a:bodyPr>
-            <a:normAutofit fontScale="92500" lnSpcReduction="20000"/>
+            <a:normAutofit fontScale="92500" lnSpcReduction="10000"/>
           </a:bodyPr>
           <a:lstStyle/>
           <a:p>
@@ -12430,14 +12493,7 @@
           <a:p>
             <a:r>
               <a:rPr lang="en-US" dirty="0"/>
-              <a:t>Global memory kernel outperformed shared memory kernel</a:t>
-            </a:r>
-          </a:p>
-          <a:p>
-            <a:pPr lvl="1"/>
-            <a:r>
-              <a:rPr lang="en-US" dirty="0"/>
-              <a:t>Surprising, though difference is quite small</a:t>
+              <a:t>Shared memory kernel outperformed global memory kernel</a:t>
             </a:r>
           </a:p>
           <a:p>

</xml_diff>